<commit_message>
usecase edited, Ethic forms corrected, prepared statments added to pages
</commit_message>
<xml_diff>
--- a/MSc Work/MSC_Project/Usecase diagram.pptx
+++ b/MSc Work/MSC_Project/Usecase diagram.pptx
@@ -243,7 +243,7 @@
           <a:p>
             <a:fld id="{4DBBCBF5-3671-4075-825D-8D6770F701C6}" type="datetimeFigureOut">
               <a:rPr lang="en-GB" smtClean="0"/>
-              <a:t>02/07/2019</a:t>
+              <a:t>03/07/2019</a:t>
             </a:fld>
             <a:endParaRPr lang="en-GB"/>
           </a:p>
@@ -413,7 +413,7 @@
           <a:p>
             <a:fld id="{4DBBCBF5-3671-4075-825D-8D6770F701C6}" type="datetimeFigureOut">
               <a:rPr lang="en-GB" smtClean="0"/>
-              <a:t>02/07/2019</a:t>
+              <a:t>03/07/2019</a:t>
             </a:fld>
             <a:endParaRPr lang="en-GB"/>
           </a:p>
@@ -593,7 +593,7 @@
           <a:p>
             <a:fld id="{4DBBCBF5-3671-4075-825D-8D6770F701C6}" type="datetimeFigureOut">
               <a:rPr lang="en-GB" smtClean="0"/>
-              <a:t>02/07/2019</a:t>
+              <a:t>03/07/2019</a:t>
             </a:fld>
             <a:endParaRPr lang="en-GB"/>
           </a:p>
@@ -763,7 +763,7 @@
           <a:p>
             <a:fld id="{4DBBCBF5-3671-4075-825D-8D6770F701C6}" type="datetimeFigureOut">
               <a:rPr lang="en-GB" smtClean="0"/>
-              <a:t>02/07/2019</a:t>
+              <a:t>03/07/2019</a:t>
             </a:fld>
             <a:endParaRPr lang="en-GB"/>
           </a:p>
@@ -1007,7 +1007,7 @@
           <a:p>
             <a:fld id="{4DBBCBF5-3671-4075-825D-8D6770F701C6}" type="datetimeFigureOut">
               <a:rPr lang="en-GB" smtClean="0"/>
-              <a:t>02/07/2019</a:t>
+              <a:t>03/07/2019</a:t>
             </a:fld>
             <a:endParaRPr lang="en-GB"/>
           </a:p>
@@ -1239,7 +1239,7 @@
           <a:p>
             <a:fld id="{4DBBCBF5-3671-4075-825D-8D6770F701C6}" type="datetimeFigureOut">
               <a:rPr lang="en-GB" smtClean="0"/>
-              <a:t>02/07/2019</a:t>
+              <a:t>03/07/2019</a:t>
             </a:fld>
             <a:endParaRPr lang="en-GB"/>
           </a:p>
@@ -1606,7 +1606,7 @@
           <a:p>
             <a:fld id="{4DBBCBF5-3671-4075-825D-8D6770F701C6}" type="datetimeFigureOut">
               <a:rPr lang="en-GB" smtClean="0"/>
-              <a:t>02/07/2019</a:t>
+              <a:t>03/07/2019</a:t>
             </a:fld>
             <a:endParaRPr lang="en-GB"/>
           </a:p>
@@ -1724,7 +1724,7 @@
           <a:p>
             <a:fld id="{4DBBCBF5-3671-4075-825D-8D6770F701C6}" type="datetimeFigureOut">
               <a:rPr lang="en-GB" smtClean="0"/>
-              <a:t>02/07/2019</a:t>
+              <a:t>03/07/2019</a:t>
             </a:fld>
             <a:endParaRPr lang="en-GB"/>
           </a:p>
@@ -1819,7 +1819,7 @@
           <a:p>
             <a:fld id="{4DBBCBF5-3671-4075-825D-8D6770F701C6}" type="datetimeFigureOut">
               <a:rPr lang="en-GB" smtClean="0"/>
-              <a:t>02/07/2019</a:t>
+              <a:t>03/07/2019</a:t>
             </a:fld>
             <a:endParaRPr lang="en-GB"/>
           </a:p>
@@ -2096,7 +2096,7 @@
           <a:p>
             <a:fld id="{4DBBCBF5-3671-4075-825D-8D6770F701C6}" type="datetimeFigureOut">
               <a:rPr lang="en-GB" smtClean="0"/>
-              <a:t>02/07/2019</a:t>
+              <a:t>03/07/2019</a:t>
             </a:fld>
             <a:endParaRPr lang="en-GB"/>
           </a:p>
@@ -2353,7 +2353,7 @@
           <a:p>
             <a:fld id="{4DBBCBF5-3671-4075-825D-8D6770F701C6}" type="datetimeFigureOut">
               <a:rPr lang="en-GB" smtClean="0"/>
-              <a:t>02/07/2019</a:t>
+              <a:t>03/07/2019</a:t>
             </a:fld>
             <a:endParaRPr lang="en-GB"/>
           </a:p>
@@ -2566,7 +2566,7 @@
           <a:p>
             <a:fld id="{4DBBCBF5-3671-4075-825D-8D6770F701C6}" type="datetimeFigureOut">
               <a:rPr lang="en-GB" smtClean="0"/>
-              <a:t>02/07/2019</a:t>
+              <a:t>03/07/2019</a:t>
             </a:fld>
             <a:endParaRPr lang="en-GB"/>
           </a:p>
@@ -9253,10 +9253,10 @@
           </p:nvGrpSpPr>
           <p:grpSpPr>
             <a:xfrm>
-              <a:off x="3771920" y="2918575"/>
-              <a:ext cx="674123" cy="1509880"/>
-              <a:chOff x="3789704" y="3993851"/>
-              <a:chExt cx="674123" cy="1509880"/>
+              <a:off x="3771920" y="2909954"/>
+              <a:ext cx="798545" cy="1518501"/>
+              <a:chOff x="3789704" y="3985230"/>
+              <a:chExt cx="798545" cy="1518501"/>
             </a:xfrm>
           </p:grpSpPr>
           <p:cxnSp>
@@ -9302,9 +9302,9 @@
               <p:nvPr/>
             </p:nvCxnSpPr>
             <p:spPr>
-              <a:xfrm>
-                <a:off x="3802912" y="3993851"/>
-                <a:ext cx="660915" cy="0"/>
+              <a:xfrm flipV="1">
+                <a:off x="3802912" y="3985230"/>
+                <a:ext cx="785337" cy="0"/>
               </a:xfrm>
               <a:prstGeom prst="line">
                 <a:avLst/>
@@ -11373,8 +11373,8 @@
           </p:nvSpPr>
           <p:spPr>
             <a:xfrm>
-              <a:off x="1834574" y="3498017"/>
-              <a:ext cx="1101482" cy="309981"/>
+              <a:off x="1834573" y="3498017"/>
+              <a:ext cx="1559745" cy="752886"/>
             </a:xfrm>
             <a:prstGeom prst="ellipse">
               <a:avLst/>
@@ -11418,8 +11418,43 @@
                     <a:schemeClr val="tx1"/>
                   </a:solidFill>
                 </a:rPr>
-                <a:t>Validate user Input</a:t>
+                <a:t>Validate user </a:t>
               </a:r>
+              <a:r>
+                <a:rPr lang="en-GB" sz="700" b="1" dirty="0" smtClean="0">
+                  <a:solidFill>
+                    <a:schemeClr val="tx1"/>
+                  </a:solidFill>
+                </a:rPr>
+                <a:t>Input,</a:t>
+              </a:r>
+            </a:p>
+            <a:p>
+              <a:pPr algn="ctr"/>
+              <a:r>
+                <a:rPr lang="en-GB" sz="700" b="1" dirty="0">
+                  <a:solidFill>
+                    <a:schemeClr val="tx1"/>
+                  </a:solidFill>
+                </a:rPr>
+                <a:t>Strip unwanted </a:t>
+              </a:r>
+              <a:r>
+                <a:rPr lang="en-GB" sz="700" b="1" dirty="0" smtClean="0">
+                  <a:solidFill>
+                    <a:schemeClr val="tx1"/>
+                  </a:solidFill>
+                </a:rPr>
+                <a:t>characters, Use prepared statements </a:t>
+              </a:r>
+              <a:endParaRPr lang="en-GB" sz="700" b="1" dirty="0">
+                <a:solidFill>
+                  <a:schemeClr val="tx1"/>
+                </a:solidFill>
+              </a:endParaRPr>
+            </a:p>
+            <a:p>
+              <a:pPr algn="ctr"/>
               <a:endParaRPr lang="en-GB" sz="700" b="1" dirty="0">
                 <a:solidFill>
                   <a:schemeClr val="tx1"/>
@@ -11628,46 +11663,8 @@
           </p:nvCxnSpPr>
           <p:spPr>
             <a:xfrm flipV="1">
-              <a:off x="455545" y="3653008"/>
-              <a:ext cx="1379029" cy="906224"/>
-            </a:xfrm>
-            <a:prstGeom prst="straightConnector1">
-              <a:avLst/>
-            </a:prstGeom>
-            <a:ln>
-              <a:solidFill>
-                <a:schemeClr val="tx1"/>
-              </a:solidFill>
-              <a:tailEnd type="triangle"/>
-            </a:ln>
-          </p:spPr>
-          <p:style>
-            <a:lnRef idx="1">
-              <a:schemeClr val="accent1"/>
-            </a:lnRef>
-            <a:fillRef idx="0">
-              <a:schemeClr val="accent1"/>
-            </a:fillRef>
-            <a:effectRef idx="0">
-              <a:schemeClr val="accent1"/>
-            </a:effectRef>
-            <a:fontRef idx="minor">
-              <a:schemeClr val="tx1"/>
-            </a:fontRef>
-          </p:style>
-        </p:cxnSp>
-        <p:cxnSp>
-          <p:nvCxnSpPr>
-            <p:cNvPr id="374" name="Straight Arrow Connector 373"/>
-            <p:cNvCxnSpPr>
-              <a:endCxn id="430" idx="2"/>
-            </p:cNvCxnSpPr>
-            <p:nvPr/>
-          </p:nvCxnSpPr>
-          <p:spPr>
-            <a:xfrm flipV="1">
-              <a:off x="448053" y="4234818"/>
-              <a:ext cx="1348791" cy="336231"/>
+              <a:off x="455545" y="3874460"/>
+              <a:ext cx="1379028" cy="684774"/>
             </a:xfrm>
             <a:prstGeom prst="straightConnector1">
               <a:avLst/>
@@ -11704,47 +11701,8 @@
           </p:nvCxnSpPr>
           <p:spPr>
             <a:xfrm>
-              <a:off x="2936056" y="3653008"/>
-              <a:ext cx="2455322" cy="268404"/>
-            </a:xfrm>
-            <a:prstGeom prst="straightConnector1">
-              <a:avLst/>
-            </a:prstGeom>
-            <a:ln>
-              <a:solidFill>
-                <a:srgbClr val="00B050"/>
-              </a:solidFill>
-              <a:tailEnd type="triangle"/>
-            </a:ln>
-          </p:spPr>
-          <p:style>
-            <a:lnRef idx="1">
-              <a:schemeClr val="accent1"/>
-            </a:lnRef>
-            <a:fillRef idx="0">
-              <a:schemeClr val="accent1"/>
-            </a:fillRef>
-            <a:effectRef idx="0">
-              <a:schemeClr val="accent1"/>
-            </a:effectRef>
-            <a:fontRef idx="minor">
-              <a:schemeClr val="tx1"/>
-            </a:fontRef>
-          </p:style>
-        </p:cxnSp>
-        <p:cxnSp>
-          <p:nvCxnSpPr>
-            <p:cNvPr id="387" name="Straight Arrow Connector 386"/>
-            <p:cNvCxnSpPr>
-              <a:stCxn id="430" idx="6"/>
-              <a:endCxn id="304" idx="2"/>
-            </p:cNvCxnSpPr>
-            <p:nvPr/>
-          </p:nvCxnSpPr>
-          <p:spPr>
-            <a:xfrm>
-              <a:off x="3068925" y="4234818"/>
-              <a:ext cx="2467133" cy="384047"/>
+              <a:off x="3394318" y="3874460"/>
+              <a:ext cx="2231818" cy="663218"/>
             </a:xfrm>
             <a:prstGeom prst="straightConnector1">
               <a:avLst/>
@@ -11779,7 +11737,7 @@
           </p:nvSpPr>
           <p:spPr>
             <a:xfrm>
-              <a:off x="4114540" y="3297087"/>
+              <a:off x="3965828" y="3180712"/>
               <a:ext cx="639466" cy="108000"/>
             </a:xfrm>
             <a:prstGeom prst="rect">
@@ -11855,7 +11813,7 @@
           </p:nvSpPr>
           <p:spPr>
             <a:xfrm>
-              <a:off x="4140368" y="3753998"/>
+              <a:off x="3876452" y="4080867"/>
               <a:ext cx="639466" cy="108000"/>
             </a:xfrm>
             <a:prstGeom prst="rect">
@@ -12372,69 +12330,6 @@
         </p:cxnSp>
         <p:sp>
           <p:nvSpPr>
-            <p:cNvPr id="430" name="Oval 429"/>
-            <p:cNvSpPr/>
-            <p:nvPr/>
-          </p:nvSpPr>
-          <p:spPr>
-            <a:xfrm>
-              <a:off x="1796844" y="4087671"/>
-              <a:ext cx="1272081" cy="294293"/>
-            </a:xfrm>
-            <a:prstGeom prst="ellipse">
-              <a:avLst/>
-            </a:prstGeom>
-            <a:solidFill>
-              <a:schemeClr val="accent1">
-                <a:lumMod val="20000"/>
-                <a:lumOff val="80000"/>
-              </a:schemeClr>
-            </a:solidFill>
-            <a:ln>
-              <a:solidFill>
-                <a:schemeClr val="tx1"/>
-              </a:solidFill>
-            </a:ln>
-          </p:spPr>
-          <p:style>
-            <a:lnRef idx="2">
-              <a:schemeClr val="accent1">
-                <a:shade val="50000"/>
-              </a:schemeClr>
-            </a:lnRef>
-            <a:fillRef idx="1">
-              <a:schemeClr val="accent1"/>
-            </a:fillRef>
-            <a:effectRef idx="0">
-              <a:schemeClr val="accent1"/>
-            </a:effectRef>
-            <a:fontRef idx="minor">
-              <a:schemeClr val="lt1"/>
-            </a:fontRef>
-          </p:style>
-          <p:txBody>
-            <a:bodyPr rtlCol="0" anchor="ctr"/>
-            <a:lstStyle/>
-            <a:p>
-              <a:pPr algn="ctr"/>
-              <a:r>
-                <a:rPr lang="en-GB" sz="700" b="1" dirty="0" smtClean="0">
-                  <a:solidFill>
-                    <a:schemeClr val="tx1"/>
-                  </a:solidFill>
-                </a:rPr>
-                <a:t>Strip unwanted characters</a:t>
-              </a:r>
-              <a:endParaRPr lang="en-GB" sz="700" b="1" dirty="0">
-                <a:solidFill>
-                  <a:schemeClr val="tx1"/>
-                </a:solidFill>
-              </a:endParaRPr>
-            </a:p>
-          </p:txBody>
-        </p:sp>
-        <p:sp>
-          <p:nvSpPr>
             <p:cNvPr id="262" name="Oval 261"/>
             <p:cNvSpPr/>
             <p:nvPr/>
@@ -12531,133 +12426,6 @@
             </a:fontRef>
           </p:style>
         </p:cxnSp>
-        <p:grpSp>
-          <p:nvGrpSpPr>
-            <p:cNvPr id="274" name="Group 273"/>
-            <p:cNvGrpSpPr/>
-            <p:nvPr/>
-          </p:nvGrpSpPr>
-          <p:grpSpPr>
-            <a:xfrm>
-              <a:off x="2139150" y="3797444"/>
-              <a:ext cx="563858" cy="278410"/>
-              <a:chOff x="610173" y="3432008"/>
-              <a:chExt cx="639466" cy="324000"/>
-            </a:xfrm>
-          </p:grpSpPr>
-          <p:cxnSp>
-            <p:nvCxnSpPr>
-              <p:cNvPr id="276" name="Straight Arrow Connector 275"/>
-              <p:cNvCxnSpPr/>
-              <p:nvPr/>
-            </p:nvCxnSpPr>
-            <p:spPr>
-              <a:xfrm flipH="1">
-                <a:off x="911297" y="3432008"/>
-                <a:ext cx="6675" cy="324000"/>
-              </a:xfrm>
-              <a:prstGeom prst="straightConnector1">
-                <a:avLst/>
-              </a:prstGeom>
-              <a:ln>
-                <a:solidFill>
-                  <a:schemeClr val="tx1"/>
-                </a:solidFill>
-                <a:tailEnd type="triangle"/>
-              </a:ln>
-            </p:spPr>
-            <p:style>
-              <a:lnRef idx="1">
-                <a:schemeClr val="accent1"/>
-              </a:lnRef>
-              <a:fillRef idx="0">
-                <a:schemeClr val="accent1"/>
-              </a:fillRef>
-              <a:effectRef idx="0">
-                <a:schemeClr val="accent1"/>
-              </a:effectRef>
-              <a:fontRef idx="minor">
-                <a:schemeClr val="tx1"/>
-              </a:fontRef>
-            </p:style>
-          </p:cxnSp>
-          <p:sp>
-            <p:nvSpPr>
-              <p:cNvPr id="278" name="Rectangle 277"/>
-              <p:cNvSpPr/>
-              <p:nvPr/>
-            </p:nvSpPr>
-            <p:spPr>
-              <a:xfrm>
-                <a:off x="610173" y="3502760"/>
-                <a:ext cx="639466" cy="108000"/>
-              </a:xfrm>
-              <a:prstGeom prst="rect">
-                <a:avLst/>
-              </a:prstGeom>
-              <a:solidFill>
-                <a:schemeClr val="bg1"/>
-              </a:solidFill>
-              <a:ln>
-                <a:solidFill>
-                  <a:schemeClr val="bg1"/>
-                </a:solidFill>
-              </a:ln>
-            </p:spPr>
-            <p:style>
-              <a:lnRef idx="2">
-                <a:schemeClr val="accent1">
-                  <a:shade val="50000"/>
-                </a:schemeClr>
-              </a:lnRef>
-              <a:fillRef idx="1">
-                <a:schemeClr val="accent1"/>
-              </a:fillRef>
-              <a:effectRef idx="0">
-                <a:schemeClr val="accent1"/>
-              </a:effectRef>
-              <a:fontRef idx="minor">
-                <a:schemeClr val="lt1"/>
-              </a:fontRef>
-            </p:style>
-            <p:txBody>
-              <a:bodyPr rtlCol="0" anchor="ctr"/>
-              <a:lstStyle/>
-              <a:p>
-                <a:pPr algn="ctr"/>
-                <a:r>
-                  <a:rPr lang="en-GB" sz="800" b="1" dirty="0" smtClean="0">
-                    <a:ln w="0"/>
-                    <a:solidFill>
-                      <a:schemeClr val="tx1"/>
-                    </a:solidFill>
-                    <a:effectLst>
-                      <a:outerShdw blurRad="38100" dist="19050" dir="2700000" algn="tl" rotWithShape="0">
-                        <a:schemeClr val="dk1">
-                          <a:alpha val="40000"/>
-                        </a:schemeClr>
-                      </a:outerShdw>
-                    </a:effectLst>
-                  </a:rPr>
-                  <a:t>Include</a:t>
-                </a:r>
-                <a:endParaRPr lang="en-GB" sz="800" b="1" dirty="0">
-                  <a:ln w="0"/>
-                  <a:solidFill>
-                    <a:schemeClr val="tx1"/>
-                  </a:solidFill>
-                  <a:effectLst>
-                    <a:outerShdw blurRad="38100" dist="19050" dir="2700000" algn="tl" rotWithShape="0">
-                      <a:schemeClr val="dk1">
-                        <a:alpha val="40000"/>
-                      </a:schemeClr>
-                    </a:outerShdw>
-                  </a:effectLst>
-                </a:endParaRPr>
-              </a:p>
-            </p:txBody>
-          </p:sp>
-        </p:grpSp>
         <p:cxnSp>
           <p:nvCxnSpPr>
             <p:cNvPr id="289" name="Straight Arrow Connector 288"/>
@@ -13210,7 +12978,7 @@
           </p:nvSpPr>
           <p:spPr>
             <a:xfrm>
-              <a:off x="4641348" y="4240048"/>
+              <a:off x="4710114" y="4148599"/>
               <a:ext cx="639466" cy="108000"/>
             </a:xfrm>
             <a:prstGeom prst="rect">

</xml_diff>